<commit_message>
Add links to the github issues
</commit_message>
<xml_diff>
--- a/01-aks-and-k8s-101/slides/Introduction to AKS.pptx
+++ b/01-aks-and-k8s-101/slides/Introduction to AKS.pptx
@@ -4,8 +4,15 @@
   <p:sldMasterIdLst>
     <p:sldMasterId id="2147483648" r:id="rId1"/>
   </p:sldMasterIdLst>
+  <p:notesMasterIdLst>
+    <p:notesMasterId r:id="rId7"/>
+  </p:notesMasterIdLst>
   <p:sldIdLst>
     <p:sldId id="256" r:id="rId2"/>
+    <p:sldId id="257" r:id="rId3"/>
+    <p:sldId id="258" r:id="rId4"/>
+    <p:sldId id="260" r:id="rId5"/>
+    <p:sldId id="259" r:id="rId6"/>
   </p:sldIdLst>
   <p:sldSz cx="12192000" cy="6858000"/>
   <p:notesSz cx="6858000" cy="9144000"/>
@@ -112,6 +119,781 @@
 </p:presentation>
 </file>
 
+<file path=ppt/notesMasters/notesMaster1.xml><?xml version="1.0" encoding="utf-8"?>
+<p:notesMaster xmlns:a="http://schemas.openxmlformats.org/drawingml/2006/main" xmlns:r="http://schemas.openxmlformats.org/officeDocument/2006/relationships" xmlns:p="http://schemas.openxmlformats.org/presentationml/2006/main">
+  <p:cSld>
+    <p:bg>
+      <p:bgRef idx="1001">
+        <a:schemeClr val="bg1"/>
+      </p:bgRef>
+    </p:bg>
+    <p:spTree>
+      <p:nvGrpSpPr>
+        <p:cNvPr id="1" name=""/>
+        <p:cNvGrpSpPr/>
+        <p:nvPr/>
+      </p:nvGrpSpPr>
+      <p:grpSpPr>
+        <a:xfrm>
+          <a:off x="0" y="0"/>
+          <a:ext cx="0" cy="0"/>
+          <a:chOff x="0" y="0"/>
+          <a:chExt cx="0" cy="0"/>
+        </a:xfrm>
+      </p:grpSpPr>
+      <p:sp>
+        <p:nvSpPr>
+          <p:cNvPr id="2" name="Header Placeholder 1"/>
+          <p:cNvSpPr>
+            <a:spLocks noGrp="1"/>
+          </p:cNvSpPr>
+          <p:nvPr>
+            <p:ph type="hdr" sz="quarter"/>
+          </p:nvPr>
+        </p:nvSpPr>
+        <p:spPr>
+          <a:xfrm>
+            <a:off x="0" y="0"/>
+            <a:ext cx="2971800" cy="458788"/>
+          </a:xfrm>
+          <a:prstGeom prst="rect">
+            <a:avLst/>
+          </a:prstGeom>
+        </p:spPr>
+        <p:txBody>
+          <a:bodyPr vert="horz" lIns="91440" tIns="45720" rIns="91440" bIns="45720" rtlCol="0"/>
+          <a:lstStyle>
+            <a:lvl1pPr algn="l">
+              <a:defRPr sz="1200"/>
+            </a:lvl1pPr>
+          </a:lstStyle>
+          <a:p>
+            <a:endParaRPr lang="en-US"/>
+          </a:p>
+        </p:txBody>
+      </p:sp>
+      <p:sp>
+        <p:nvSpPr>
+          <p:cNvPr id="3" name="Date Placeholder 2"/>
+          <p:cNvSpPr>
+            <a:spLocks noGrp="1"/>
+          </p:cNvSpPr>
+          <p:nvPr>
+            <p:ph type="dt" idx="1"/>
+          </p:nvPr>
+        </p:nvSpPr>
+        <p:spPr>
+          <a:xfrm>
+            <a:off x="3884613" y="0"/>
+            <a:ext cx="2971800" cy="458788"/>
+          </a:xfrm>
+          <a:prstGeom prst="rect">
+            <a:avLst/>
+          </a:prstGeom>
+        </p:spPr>
+        <p:txBody>
+          <a:bodyPr vert="horz" lIns="91440" tIns="45720" rIns="91440" bIns="45720" rtlCol="0"/>
+          <a:lstStyle>
+            <a:lvl1pPr algn="r">
+              <a:defRPr sz="1200"/>
+            </a:lvl1pPr>
+          </a:lstStyle>
+          <a:p>
+            <a:fld id="{11837477-D453-41A7-B038-AF1F6C7EED11}" type="datetimeFigureOut">
+              <a:rPr lang="en-US" smtClean="0"/>
+              <a:t>2/8/2021</a:t>
+            </a:fld>
+            <a:endParaRPr lang="en-US"/>
+          </a:p>
+        </p:txBody>
+      </p:sp>
+      <p:sp>
+        <p:nvSpPr>
+          <p:cNvPr id="4" name="Slide Image Placeholder 3"/>
+          <p:cNvSpPr>
+            <a:spLocks noGrp="1" noRot="1" noChangeAspect="1"/>
+          </p:cNvSpPr>
+          <p:nvPr>
+            <p:ph type="sldImg" idx="2"/>
+          </p:nvPr>
+        </p:nvSpPr>
+        <p:spPr>
+          <a:xfrm>
+            <a:off x="685800" y="1143000"/>
+            <a:ext cx="5486400" cy="3086100"/>
+          </a:xfrm>
+          <a:prstGeom prst="rect">
+            <a:avLst/>
+          </a:prstGeom>
+          <a:noFill/>
+          <a:ln w="12700">
+            <a:solidFill>
+              <a:prstClr val="black"/>
+            </a:solidFill>
+          </a:ln>
+        </p:spPr>
+        <p:txBody>
+          <a:bodyPr vert="horz" lIns="91440" tIns="45720" rIns="91440" bIns="45720" rtlCol="0" anchor="ctr"/>
+          <a:lstStyle/>
+          <a:p>
+            <a:endParaRPr lang="en-US"/>
+          </a:p>
+        </p:txBody>
+      </p:sp>
+      <p:sp>
+        <p:nvSpPr>
+          <p:cNvPr id="5" name="Notes Placeholder 4"/>
+          <p:cNvSpPr>
+            <a:spLocks noGrp="1"/>
+          </p:cNvSpPr>
+          <p:nvPr>
+            <p:ph type="body" sz="quarter" idx="3"/>
+          </p:nvPr>
+        </p:nvSpPr>
+        <p:spPr>
+          <a:xfrm>
+            <a:off x="685800" y="4400550"/>
+            <a:ext cx="5486400" cy="3600450"/>
+          </a:xfrm>
+          <a:prstGeom prst="rect">
+            <a:avLst/>
+          </a:prstGeom>
+        </p:spPr>
+        <p:txBody>
+          <a:bodyPr vert="horz" lIns="91440" tIns="45720" rIns="91440" bIns="45720" rtlCol="0"/>
+          <a:lstStyle/>
+          <a:p>
+            <a:pPr lvl="0"/>
+            <a:r>
+              <a:rPr lang="en-US"/>
+              <a:t>Click to edit Master text styles</a:t>
+            </a:r>
+          </a:p>
+          <a:p>
+            <a:pPr lvl="1"/>
+            <a:r>
+              <a:rPr lang="en-US"/>
+              <a:t>Second level</a:t>
+            </a:r>
+          </a:p>
+          <a:p>
+            <a:pPr lvl="2"/>
+            <a:r>
+              <a:rPr lang="en-US"/>
+              <a:t>Third level</a:t>
+            </a:r>
+          </a:p>
+          <a:p>
+            <a:pPr lvl="3"/>
+            <a:r>
+              <a:rPr lang="en-US"/>
+              <a:t>Fourth level</a:t>
+            </a:r>
+          </a:p>
+          <a:p>
+            <a:pPr lvl="4"/>
+            <a:r>
+              <a:rPr lang="en-US"/>
+              <a:t>Fifth level</a:t>
+            </a:r>
+          </a:p>
+        </p:txBody>
+      </p:sp>
+      <p:sp>
+        <p:nvSpPr>
+          <p:cNvPr id="6" name="Footer Placeholder 5"/>
+          <p:cNvSpPr>
+            <a:spLocks noGrp="1"/>
+          </p:cNvSpPr>
+          <p:nvPr>
+            <p:ph type="ftr" sz="quarter" idx="4"/>
+          </p:nvPr>
+        </p:nvSpPr>
+        <p:spPr>
+          <a:xfrm>
+            <a:off x="0" y="8685213"/>
+            <a:ext cx="2971800" cy="458787"/>
+          </a:xfrm>
+          <a:prstGeom prst="rect">
+            <a:avLst/>
+          </a:prstGeom>
+        </p:spPr>
+        <p:txBody>
+          <a:bodyPr vert="horz" lIns="91440" tIns="45720" rIns="91440" bIns="45720" rtlCol="0" anchor="b"/>
+          <a:lstStyle>
+            <a:lvl1pPr algn="l">
+              <a:defRPr sz="1200"/>
+            </a:lvl1pPr>
+          </a:lstStyle>
+          <a:p>
+            <a:endParaRPr lang="en-US"/>
+          </a:p>
+        </p:txBody>
+      </p:sp>
+      <p:sp>
+        <p:nvSpPr>
+          <p:cNvPr id="7" name="Slide Number Placeholder 6"/>
+          <p:cNvSpPr>
+            <a:spLocks noGrp="1"/>
+          </p:cNvSpPr>
+          <p:nvPr>
+            <p:ph type="sldNum" sz="quarter" idx="5"/>
+          </p:nvPr>
+        </p:nvSpPr>
+        <p:spPr>
+          <a:xfrm>
+            <a:off x="3884613" y="8685213"/>
+            <a:ext cx="2971800" cy="458787"/>
+          </a:xfrm>
+          <a:prstGeom prst="rect">
+            <a:avLst/>
+          </a:prstGeom>
+        </p:spPr>
+        <p:txBody>
+          <a:bodyPr vert="horz" lIns="91440" tIns="45720" rIns="91440" bIns="45720" rtlCol="0" anchor="b"/>
+          <a:lstStyle>
+            <a:lvl1pPr algn="r">
+              <a:defRPr sz="1200"/>
+            </a:lvl1pPr>
+          </a:lstStyle>
+          <a:p>
+            <a:fld id="{00A560F4-8102-4EC4-BB24-179BCBD2EB8E}" type="slidenum">
+              <a:rPr lang="en-US" smtClean="0"/>
+              <a:t>‹#›</a:t>
+            </a:fld>
+            <a:endParaRPr lang="en-US"/>
+          </a:p>
+        </p:txBody>
+      </p:sp>
+    </p:spTree>
+    <p:extLst>
+      <p:ext uri="{BB962C8B-B14F-4D97-AF65-F5344CB8AC3E}">
+        <p14:creationId xmlns:p14="http://schemas.microsoft.com/office/powerpoint/2010/main" val="3001037570"/>
+      </p:ext>
+    </p:extLst>
+  </p:cSld>
+  <p:clrMap bg1="lt1" tx1="dk1" bg2="lt2" tx2="dk2" accent1="accent1" accent2="accent2" accent3="accent3" accent4="accent4" accent5="accent5" accent6="accent6" hlink="hlink" folHlink="folHlink"/>
+  <p:notesStyle>
+    <a:lvl1pPr marL="0" algn="l" defTabSz="914400" rtl="0" eaLnBrk="1" latinLnBrk="0" hangingPunct="1">
+      <a:defRPr sz="1200" kern="1200">
+        <a:solidFill>
+          <a:schemeClr val="tx1"/>
+        </a:solidFill>
+        <a:latin typeface="+mn-lt"/>
+        <a:ea typeface="+mn-ea"/>
+        <a:cs typeface="+mn-cs"/>
+      </a:defRPr>
+    </a:lvl1pPr>
+    <a:lvl2pPr marL="457200" algn="l" defTabSz="914400" rtl="0" eaLnBrk="1" latinLnBrk="0" hangingPunct="1">
+      <a:defRPr sz="1200" kern="1200">
+        <a:solidFill>
+          <a:schemeClr val="tx1"/>
+        </a:solidFill>
+        <a:latin typeface="+mn-lt"/>
+        <a:ea typeface="+mn-ea"/>
+        <a:cs typeface="+mn-cs"/>
+      </a:defRPr>
+    </a:lvl2pPr>
+    <a:lvl3pPr marL="914400" algn="l" defTabSz="914400" rtl="0" eaLnBrk="1" latinLnBrk="0" hangingPunct="1">
+      <a:defRPr sz="1200" kern="1200">
+        <a:solidFill>
+          <a:schemeClr val="tx1"/>
+        </a:solidFill>
+        <a:latin typeface="+mn-lt"/>
+        <a:ea typeface="+mn-ea"/>
+        <a:cs typeface="+mn-cs"/>
+      </a:defRPr>
+    </a:lvl3pPr>
+    <a:lvl4pPr marL="1371600" algn="l" defTabSz="914400" rtl="0" eaLnBrk="1" latinLnBrk="0" hangingPunct="1">
+      <a:defRPr sz="1200" kern="1200">
+        <a:solidFill>
+          <a:schemeClr val="tx1"/>
+        </a:solidFill>
+        <a:latin typeface="+mn-lt"/>
+        <a:ea typeface="+mn-ea"/>
+        <a:cs typeface="+mn-cs"/>
+      </a:defRPr>
+    </a:lvl4pPr>
+    <a:lvl5pPr marL="1828800" algn="l" defTabSz="914400" rtl="0" eaLnBrk="1" latinLnBrk="0" hangingPunct="1">
+      <a:defRPr sz="1200" kern="1200">
+        <a:solidFill>
+          <a:schemeClr val="tx1"/>
+        </a:solidFill>
+        <a:latin typeface="+mn-lt"/>
+        <a:ea typeface="+mn-ea"/>
+        <a:cs typeface="+mn-cs"/>
+      </a:defRPr>
+    </a:lvl5pPr>
+    <a:lvl6pPr marL="2286000" algn="l" defTabSz="914400" rtl="0" eaLnBrk="1" latinLnBrk="0" hangingPunct="1">
+      <a:defRPr sz="1200" kern="1200">
+        <a:solidFill>
+          <a:schemeClr val="tx1"/>
+        </a:solidFill>
+        <a:latin typeface="+mn-lt"/>
+        <a:ea typeface="+mn-ea"/>
+        <a:cs typeface="+mn-cs"/>
+      </a:defRPr>
+    </a:lvl6pPr>
+    <a:lvl7pPr marL="2743200" algn="l" defTabSz="914400" rtl="0" eaLnBrk="1" latinLnBrk="0" hangingPunct="1">
+      <a:defRPr sz="1200" kern="1200">
+        <a:solidFill>
+          <a:schemeClr val="tx1"/>
+        </a:solidFill>
+        <a:latin typeface="+mn-lt"/>
+        <a:ea typeface="+mn-ea"/>
+        <a:cs typeface="+mn-cs"/>
+      </a:defRPr>
+    </a:lvl7pPr>
+    <a:lvl8pPr marL="3200400" algn="l" defTabSz="914400" rtl="0" eaLnBrk="1" latinLnBrk="0" hangingPunct="1">
+      <a:defRPr sz="1200" kern="1200">
+        <a:solidFill>
+          <a:schemeClr val="tx1"/>
+        </a:solidFill>
+        <a:latin typeface="+mn-lt"/>
+        <a:ea typeface="+mn-ea"/>
+        <a:cs typeface="+mn-cs"/>
+      </a:defRPr>
+    </a:lvl8pPr>
+    <a:lvl9pPr marL="3657600" algn="l" defTabSz="914400" rtl="0" eaLnBrk="1" latinLnBrk="0" hangingPunct="1">
+      <a:defRPr sz="1200" kern="1200">
+        <a:solidFill>
+          <a:schemeClr val="tx1"/>
+        </a:solidFill>
+        <a:latin typeface="+mn-lt"/>
+        <a:ea typeface="+mn-ea"/>
+        <a:cs typeface="+mn-cs"/>
+      </a:defRPr>
+    </a:lvl9pPr>
+  </p:notesStyle>
+</p:notesMaster>
+</file>
+
+<file path=ppt/notesSlides/notesSlide1.xml><?xml version="1.0" encoding="utf-8"?>
+<p:notes xmlns:a="http://schemas.openxmlformats.org/drawingml/2006/main" xmlns:r="http://schemas.openxmlformats.org/officeDocument/2006/relationships" xmlns:p="http://schemas.openxmlformats.org/presentationml/2006/main" showMasterSp="0" showMasterPhAnim="0">
+  <p:cSld>
+    <p:spTree>
+      <p:nvGrpSpPr>
+        <p:cNvPr id="1" name="Shape 57"/>
+        <p:cNvGrpSpPr/>
+        <p:nvPr/>
+      </p:nvGrpSpPr>
+      <p:grpSpPr>
+        <a:xfrm>
+          <a:off x="0" y="0"/>
+          <a:ext cx="0" cy="0"/>
+          <a:chOff x="0" y="0"/>
+          <a:chExt cx="0" cy="0"/>
+        </a:xfrm>
+      </p:grpSpPr>
+      <p:sp>
+        <p:nvSpPr>
+          <p:cNvPr id="58" name="Google Shape;58;g7df43cfd70_0_78:notes"/>
+          <p:cNvSpPr>
+            <a:spLocks noGrp="1" noRot="1" noChangeAspect="1"/>
+          </p:cNvSpPr>
+          <p:nvPr>
+            <p:ph type="sldImg" idx="2"/>
+          </p:nvPr>
+        </p:nvSpPr>
+        <p:spPr>
+          <a:xfrm>
+            <a:off x="381000" y="685800"/>
+            <a:ext cx="6096000" cy="3429000"/>
+          </a:xfrm>
+          <a:custGeom>
+            <a:avLst/>
+            <a:gdLst/>
+            <a:ahLst/>
+            <a:cxnLst/>
+            <a:rect l="l" t="t" r="r" b="b"/>
+            <a:pathLst>
+              <a:path w="120000" h="120000" extrusionOk="0">
+                <a:moveTo>
+                  <a:pt x="0" y="0"/>
+                </a:moveTo>
+                <a:lnTo>
+                  <a:pt x="120000" y="0"/>
+                </a:lnTo>
+                <a:lnTo>
+                  <a:pt x="120000" y="120000"/>
+                </a:lnTo>
+                <a:lnTo>
+                  <a:pt x="0" y="120000"/>
+                </a:lnTo>
+                <a:close/>
+              </a:path>
+            </a:pathLst>
+          </a:custGeom>
+        </p:spPr>
+      </p:sp>
+      <p:sp>
+        <p:nvSpPr>
+          <p:cNvPr id="59" name="Google Shape;59;g7df43cfd70_0_78:notes"/>
+          <p:cNvSpPr txBox="1">
+            <a:spLocks noGrp="1"/>
+          </p:cNvSpPr>
+          <p:nvPr>
+            <p:ph type="body" idx="1"/>
+          </p:nvPr>
+        </p:nvSpPr>
+        <p:spPr>
+          <a:xfrm>
+            <a:off x="685800" y="4343400"/>
+            <a:ext cx="5486400" cy="4114800"/>
+          </a:xfrm>
+          <a:prstGeom prst="rect">
+            <a:avLst/>
+          </a:prstGeom>
+        </p:spPr>
+        <p:txBody>
+          <a:bodyPr spcFirstLastPara="1" wrap="square" lIns="91425" tIns="91425" rIns="91425" bIns="91425" anchor="t" anchorCtr="0">
+            <a:noAutofit/>
+          </a:bodyPr>
+          <a:lstStyle/>
+          <a:p>
+            <a:pPr marL="0" lvl="0" indent="0" algn="l" rtl="0">
+              <a:spcBef>
+                <a:spcPts val="0"/>
+              </a:spcBef>
+              <a:spcAft>
+                <a:spcPts val="0"/>
+              </a:spcAft>
+              <a:buNone/>
+            </a:pPr>
+            <a:endParaRPr/>
+          </a:p>
+        </p:txBody>
+      </p:sp>
+    </p:spTree>
+  </p:cSld>
+  <p:clrMapOvr>
+    <a:masterClrMapping/>
+  </p:clrMapOvr>
+</p:notes>
+</file>
+
+<file path=ppt/notesSlides/notesSlide2.xml><?xml version="1.0" encoding="utf-8"?>
+<p:notes xmlns:a="http://schemas.openxmlformats.org/drawingml/2006/main" xmlns:r="http://schemas.openxmlformats.org/officeDocument/2006/relationships" xmlns:p="http://schemas.openxmlformats.org/presentationml/2006/main" showMasterSp="0" showMasterPhAnim="0">
+  <p:cSld>
+    <p:spTree>
+      <p:nvGrpSpPr>
+        <p:cNvPr id="1" name="Shape 64"/>
+        <p:cNvGrpSpPr/>
+        <p:nvPr/>
+      </p:nvGrpSpPr>
+      <p:grpSpPr>
+        <a:xfrm>
+          <a:off x="0" y="0"/>
+          <a:ext cx="0" cy="0"/>
+          <a:chOff x="0" y="0"/>
+          <a:chExt cx="0" cy="0"/>
+        </a:xfrm>
+      </p:grpSpPr>
+      <p:sp>
+        <p:nvSpPr>
+          <p:cNvPr id="65" name="Google Shape;65;g7fd950372b_1_3:notes"/>
+          <p:cNvSpPr>
+            <a:spLocks noGrp="1" noRot="1" noChangeAspect="1"/>
+          </p:cNvSpPr>
+          <p:nvPr>
+            <p:ph type="sldImg" idx="2"/>
+          </p:nvPr>
+        </p:nvSpPr>
+        <p:spPr>
+          <a:xfrm>
+            <a:off x="381000" y="685800"/>
+            <a:ext cx="6096000" cy="3429000"/>
+          </a:xfrm>
+          <a:custGeom>
+            <a:avLst/>
+            <a:gdLst/>
+            <a:ahLst/>
+            <a:cxnLst/>
+            <a:rect l="l" t="t" r="r" b="b"/>
+            <a:pathLst>
+              <a:path w="120000" h="120000" extrusionOk="0">
+                <a:moveTo>
+                  <a:pt x="0" y="0"/>
+                </a:moveTo>
+                <a:lnTo>
+                  <a:pt x="120000" y="0"/>
+                </a:lnTo>
+                <a:lnTo>
+                  <a:pt x="120000" y="120000"/>
+                </a:lnTo>
+                <a:lnTo>
+                  <a:pt x="0" y="120000"/>
+                </a:lnTo>
+                <a:close/>
+              </a:path>
+            </a:pathLst>
+          </a:custGeom>
+        </p:spPr>
+      </p:sp>
+      <p:sp>
+        <p:nvSpPr>
+          <p:cNvPr id="66" name="Google Shape;66;g7fd950372b_1_3:notes"/>
+          <p:cNvSpPr txBox="1">
+            <a:spLocks noGrp="1"/>
+          </p:cNvSpPr>
+          <p:nvPr>
+            <p:ph type="body" idx="1"/>
+          </p:nvPr>
+        </p:nvSpPr>
+        <p:spPr>
+          <a:xfrm>
+            <a:off x="685800" y="4343400"/>
+            <a:ext cx="5486400" cy="4114800"/>
+          </a:xfrm>
+          <a:prstGeom prst="rect">
+            <a:avLst/>
+          </a:prstGeom>
+        </p:spPr>
+        <p:txBody>
+          <a:bodyPr spcFirstLastPara="1" wrap="square" lIns="91425" tIns="91425" rIns="91425" bIns="91425" anchor="t" anchorCtr="0">
+            <a:noAutofit/>
+          </a:bodyPr>
+          <a:lstStyle/>
+          <a:p>
+            <a:pPr marL="0" lvl="0" indent="0" algn="l" rtl="0">
+              <a:spcBef>
+                <a:spcPts val="0"/>
+              </a:spcBef>
+              <a:spcAft>
+                <a:spcPts val="0"/>
+              </a:spcAft>
+              <a:buNone/>
+            </a:pPr>
+            <a:endParaRPr/>
+          </a:p>
+        </p:txBody>
+      </p:sp>
+    </p:spTree>
+  </p:cSld>
+  <p:clrMapOvr>
+    <a:masterClrMapping/>
+  </p:clrMapOvr>
+</p:notes>
+</file>
+
+<file path=ppt/notesSlides/notesSlide3.xml><?xml version="1.0" encoding="utf-8"?>
+<p:notes xmlns:a="http://schemas.openxmlformats.org/drawingml/2006/main" xmlns:r="http://schemas.openxmlformats.org/officeDocument/2006/relationships" xmlns:p="http://schemas.openxmlformats.org/presentationml/2006/main" showMasterSp="0" showMasterPhAnim="0">
+  <p:cSld>
+    <p:spTree>
+      <p:nvGrpSpPr>
+        <p:cNvPr id="1" name="Shape 64"/>
+        <p:cNvGrpSpPr/>
+        <p:nvPr/>
+      </p:nvGrpSpPr>
+      <p:grpSpPr>
+        <a:xfrm>
+          <a:off x="0" y="0"/>
+          <a:ext cx="0" cy="0"/>
+          <a:chOff x="0" y="0"/>
+          <a:chExt cx="0" cy="0"/>
+        </a:xfrm>
+      </p:grpSpPr>
+      <p:sp>
+        <p:nvSpPr>
+          <p:cNvPr id="65" name="Google Shape;65;g7fd950372b_1_3:notes"/>
+          <p:cNvSpPr>
+            <a:spLocks noGrp="1" noRot="1" noChangeAspect="1"/>
+          </p:cNvSpPr>
+          <p:nvPr>
+            <p:ph type="sldImg" idx="2"/>
+          </p:nvPr>
+        </p:nvSpPr>
+        <p:spPr>
+          <a:xfrm>
+            <a:off x="381000" y="685800"/>
+            <a:ext cx="6096000" cy="3429000"/>
+          </a:xfrm>
+          <a:custGeom>
+            <a:avLst/>
+            <a:gdLst/>
+            <a:ahLst/>
+            <a:cxnLst/>
+            <a:rect l="l" t="t" r="r" b="b"/>
+            <a:pathLst>
+              <a:path w="120000" h="120000" extrusionOk="0">
+                <a:moveTo>
+                  <a:pt x="0" y="0"/>
+                </a:moveTo>
+                <a:lnTo>
+                  <a:pt x="120000" y="0"/>
+                </a:lnTo>
+                <a:lnTo>
+                  <a:pt x="120000" y="120000"/>
+                </a:lnTo>
+                <a:lnTo>
+                  <a:pt x="0" y="120000"/>
+                </a:lnTo>
+                <a:close/>
+              </a:path>
+            </a:pathLst>
+          </a:custGeom>
+        </p:spPr>
+      </p:sp>
+      <p:sp>
+        <p:nvSpPr>
+          <p:cNvPr id="66" name="Google Shape;66;g7fd950372b_1_3:notes"/>
+          <p:cNvSpPr txBox="1">
+            <a:spLocks noGrp="1"/>
+          </p:cNvSpPr>
+          <p:nvPr>
+            <p:ph type="body" idx="1"/>
+          </p:nvPr>
+        </p:nvSpPr>
+        <p:spPr>
+          <a:xfrm>
+            <a:off x="685800" y="4343400"/>
+            <a:ext cx="5486400" cy="4114800"/>
+          </a:xfrm>
+          <a:prstGeom prst="rect">
+            <a:avLst/>
+          </a:prstGeom>
+        </p:spPr>
+        <p:txBody>
+          <a:bodyPr spcFirstLastPara="1" wrap="square" lIns="91425" tIns="91425" rIns="91425" bIns="91425" anchor="t" anchorCtr="0">
+            <a:noAutofit/>
+          </a:bodyPr>
+          <a:lstStyle/>
+          <a:p>
+            <a:pPr marL="0" lvl="0" indent="0" algn="l" rtl="0">
+              <a:spcBef>
+                <a:spcPts val="0"/>
+              </a:spcBef>
+              <a:spcAft>
+                <a:spcPts val="0"/>
+              </a:spcAft>
+              <a:buNone/>
+            </a:pPr>
+            <a:endParaRPr/>
+          </a:p>
+        </p:txBody>
+      </p:sp>
+    </p:spTree>
+    <p:extLst>
+      <p:ext uri="{BB962C8B-B14F-4D97-AF65-F5344CB8AC3E}">
+        <p14:creationId xmlns:p14="http://schemas.microsoft.com/office/powerpoint/2010/main" val="172796591"/>
+      </p:ext>
+    </p:extLst>
+  </p:cSld>
+  <p:clrMapOvr>
+    <a:masterClrMapping/>
+  </p:clrMapOvr>
+</p:notes>
+</file>
+
+<file path=ppt/notesSlides/notesSlide4.xml><?xml version="1.0" encoding="utf-8"?>
+<p:notes xmlns:a="http://schemas.openxmlformats.org/drawingml/2006/main" xmlns:r="http://schemas.openxmlformats.org/officeDocument/2006/relationships" xmlns:p="http://schemas.openxmlformats.org/presentationml/2006/main" showMasterSp="0" showMasterPhAnim="0">
+  <p:cSld>
+    <p:spTree>
+      <p:nvGrpSpPr>
+        <p:cNvPr id="1" name="Shape 64"/>
+        <p:cNvGrpSpPr/>
+        <p:nvPr/>
+      </p:nvGrpSpPr>
+      <p:grpSpPr>
+        <a:xfrm>
+          <a:off x="0" y="0"/>
+          <a:ext cx="0" cy="0"/>
+          <a:chOff x="0" y="0"/>
+          <a:chExt cx="0" cy="0"/>
+        </a:xfrm>
+      </p:grpSpPr>
+      <p:sp>
+        <p:nvSpPr>
+          <p:cNvPr id="65" name="Google Shape;65;g7fd950372b_1_3:notes"/>
+          <p:cNvSpPr>
+            <a:spLocks noGrp="1" noRot="1" noChangeAspect="1"/>
+          </p:cNvSpPr>
+          <p:nvPr>
+            <p:ph type="sldImg" idx="2"/>
+          </p:nvPr>
+        </p:nvSpPr>
+        <p:spPr>
+          <a:xfrm>
+            <a:off x="381000" y="685800"/>
+            <a:ext cx="6096000" cy="3429000"/>
+          </a:xfrm>
+          <a:custGeom>
+            <a:avLst/>
+            <a:gdLst/>
+            <a:ahLst/>
+            <a:cxnLst/>
+            <a:rect l="l" t="t" r="r" b="b"/>
+            <a:pathLst>
+              <a:path w="120000" h="120000" extrusionOk="0">
+                <a:moveTo>
+                  <a:pt x="0" y="0"/>
+                </a:moveTo>
+                <a:lnTo>
+                  <a:pt x="120000" y="0"/>
+                </a:lnTo>
+                <a:lnTo>
+                  <a:pt x="120000" y="120000"/>
+                </a:lnTo>
+                <a:lnTo>
+                  <a:pt x="0" y="120000"/>
+                </a:lnTo>
+                <a:close/>
+              </a:path>
+            </a:pathLst>
+          </a:custGeom>
+        </p:spPr>
+      </p:sp>
+      <p:sp>
+        <p:nvSpPr>
+          <p:cNvPr id="66" name="Google Shape;66;g7fd950372b_1_3:notes"/>
+          <p:cNvSpPr txBox="1">
+            <a:spLocks noGrp="1"/>
+          </p:cNvSpPr>
+          <p:nvPr>
+            <p:ph type="body" idx="1"/>
+          </p:nvPr>
+        </p:nvSpPr>
+        <p:spPr>
+          <a:xfrm>
+            <a:off x="685800" y="4343400"/>
+            <a:ext cx="5486400" cy="4114800"/>
+          </a:xfrm>
+          <a:prstGeom prst="rect">
+            <a:avLst/>
+          </a:prstGeom>
+        </p:spPr>
+        <p:txBody>
+          <a:bodyPr spcFirstLastPara="1" wrap="square" lIns="91425" tIns="91425" rIns="91425" bIns="91425" anchor="t" anchorCtr="0">
+            <a:noAutofit/>
+          </a:bodyPr>
+          <a:lstStyle/>
+          <a:p>
+            <a:pPr marL="0" lvl="0" indent="0" algn="l" rtl="0">
+              <a:spcBef>
+                <a:spcPts val="0"/>
+              </a:spcBef>
+              <a:spcAft>
+                <a:spcPts val="0"/>
+              </a:spcAft>
+              <a:buNone/>
+            </a:pPr>
+            <a:endParaRPr/>
+          </a:p>
+        </p:txBody>
+      </p:sp>
+    </p:spTree>
+    <p:extLst>
+      <p:ext uri="{BB962C8B-B14F-4D97-AF65-F5344CB8AC3E}">
+        <p14:creationId xmlns:p14="http://schemas.microsoft.com/office/powerpoint/2010/main" val="2849217478"/>
+      </p:ext>
+    </p:extLst>
+  </p:cSld>
+  <p:clrMapOvr>
+    <a:masterClrMapping/>
+  </p:clrMapOvr>
+</p:notes>
+</file>
+
 <file path=ppt/slideLayouts/slideLayout1.xml><?xml version="1.0" encoding="utf-8"?>
 <p:sldLayout xmlns:a="http://schemas.openxmlformats.org/drawingml/2006/main" xmlns:r="http://schemas.openxmlformats.org/officeDocument/2006/relationships" xmlns:p="http://schemas.openxmlformats.org/presentationml/2006/main" type="title" preserve="1">
   <p:cSld name="Title Slide">
@@ -259,7 +1041,7 @@
           <a:p>
             <a:fld id="{CE88D40F-0E01-46E3-A0A3-09B1E418DDBF}" type="datetimeFigureOut">
               <a:rPr lang="en-US" smtClean="0"/>
-              <a:t>1/26/2021</a:t>
+              <a:t>2/8/2021</a:t>
             </a:fld>
             <a:endParaRPr lang="en-US"/>
           </a:p>
@@ -457,7 +1239,7 @@
           <a:p>
             <a:fld id="{CE88D40F-0E01-46E3-A0A3-09B1E418DDBF}" type="datetimeFigureOut">
               <a:rPr lang="en-US" smtClean="0"/>
-              <a:t>1/26/2021</a:t>
+              <a:t>2/8/2021</a:t>
             </a:fld>
             <a:endParaRPr lang="en-US"/>
           </a:p>
@@ -665,7 +1447,7 @@
           <a:p>
             <a:fld id="{CE88D40F-0E01-46E3-A0A3-09B1E418DDBF}" type="datetimeFigureOut">
               <a:rPr lang="en-US" smtClean="0"/>
-              <a:t>1/26/2021</a:t>
+              <a:t>2/8/2021</a:t>
             </a:fld>
             <a:endParaRPr lang="en-US"/>
           </a:p>
@@ -729,6 +1511,365 @@
     <p:extLst>
       <p:ext uri="{BB962C8B-B14F-4D97-AF65-F5344CB8AC3E}">
         <p14:creationId xmlns:p14="http://schemas.microsoft.com/office/powerpoint/2010/main" val="4269625266"/>
+      </p:ext>
+    </p:extLst>
+  </p:cSld>
+  <p:clrMapOvr>
+    <a:masterClrMapping/>
+  </p:clrMapOvr>
+</p:sldLayout>
+</file>
+
+<file path=ppt/slideLayouts/slideLayout12.xml><?xml version="1.0" encoding="utf-8"?>
+<p:sldLayout xmlns:a="http://schemas.openxmlformats.org/drawingml/2006/main" xmlns:r="http://schemas.openxmlformats.org/officeDocument/2006/relationships" xmlns:p="http://schemas.openxmlformats.org/presentationml/2006/main" matchingName="Title and body" type="tx">
+  <p:cSld name="Title and body">
+    <p:spTree>
+      <p:nvGrpSpPr>
+        <p:cNvPr id="1" name="Shape 16"/>
+        <p:cNvGrpSpPr/>
+        <p:nvPr/>
+      </p:nvGrpSpPr>
+      <p:grpSpPr>
+        <a:xfrm>
+          <a:off x="0" y="0"/>
+          <a:ext cx="0" cy="0"/>
+          <a:chOff x="0" y="0"/>
+          <a:chExt cx="0" cy="0"/>
+        </a:xfrm>
+      </p:grpSpPr>
+      <p:sp>
+        <p:nvSpPr>
+          <p:cNvPr id="17" name="Google Shape;17;p4"/>
+          <p:cNvSpPr txBox="1">
+            <a:spLocks noGrp="1"/>
+          </p:cNvSpPr>
+          <p:nvPr>
+            <p:ph type="title"/>
+          </p:nvPr>
+        </p:nvSpPr>
+        <p:spPr>
+          <a:xfrm>
+            <a:off x="415600" y="593367"/>
+            <a:ext cx="11360800" cy="763600"/>
+          </a:xfrm>
+          <a:prstGeom prst="rect">
+            <a:avLst/>
+          </a:prstGeom>
+        </p:spPr>
+        <p:txBody>
+          <a:bodyPr spcFirstLastPara="1" wrap="square" lIns="91425" tIns="91425" rIns="91425" bIns="91425" anchor="t" anchorCtr="0">
+            <a:noAutofit/>
+          </a:bodyPr>
+          <a:lstStyle>
+            <a:lvl1pPr lvl="0">
+              <a:spcBef>
+                <a:spcPts val="0"/>
+              </a:spcBef>
+              <a:spcAft>
+                <a:spcPts val="0"/>
+              </a:spcAft>
+              <a:buSzPts val="2800"/>
+              <a:buNone/>
+              <a:defRPr/>
+            </a:lvl1pPr>
+            <a:lvl2pPr lvl="1">
+              <a:spcBef>
+                <a:spcPts val="0"/>
+              </a:spcBef>
+              <a:spcAft>
+                <a:spcPts val="0"/>
+              </a:spcAft>
+              <a:buSzPts val="2800"/>
+              <a:buNone/>
+              <a:defRPr/>
+            </a:lvl2pPr>
+            <a:lvl3pPr lvl="2">
+              <a:spcBef>
+                <a:spcPts val="0"/>
+              </a:spcBef>
+              <a:spcAft>
+                <a:spcPts val="0"/>
+              </a:spcAft>
+              <a:buSzPts val="2800"/>
+              <a:buNone/>
+              <a:defRPr/>
+            </a:lvl3pPr>
+            <a:lvl4pPr lvl="3">
+              <a:spcBef>
+                <a:spcPts val="0"/>
+              </a:spcBef>
+              <a:spcAft>
+                <a:spcPts val="0"/>
+              </a:spcAft>
+              <a:buSzPts val="2800"/>
+              <a:buNone/>
+              <a:defRPr/>
+            </a:lvl4pPr>
+            <a:lvl5pPr lvl="4">
+              <a:spcBef>
+                <a:spcPts val="0"/>
+              </a:spcBef>
+              <a:spcAft>
+                <a:spcPts val="0"/>
+              </a:spcAft>
+              <a:buSzPts val="2800"/>
+              <a:buNone/>
+              <a:defRPr/>
+            </a:lvl5pPr>
+            <a:lvl6pPr lvl="5">
+              <a:spcBef>
+                <a:spcPts val="0"/>
+              </a:spcBef>
+              <a:spcAft>
+                <a:spcPts val="0"/>
+              </a:spcAft>
+              <a:buSzPts val="2800"/>
+              <a:buNone/>
+              <a:defRPr/>
+            </a:lvl6pPr>
+            <a:lvl7pPr lvl="6">
+              <a:spcBef>
+                <a:spcPts val="0"/>
+              </a:spcBef>
+              <a:spcAft>
+                <a:spcPts val="0"/>
+              </a:spcAft>
+              <a:buSzPts val="2800"/>
+              <a:buNone/>
+              <a:defRPr/>
+            </a:lvl7pPr>
+            <a:lvl8pPr lvl="7">
+              <a:spcBef>
+                <a:spcPts val="0"/>
+              </a:spcBef>
+              <a:spcAft>
+                <a:spcPts val="0"/>
+              </a:spcAft>
+              <a:buSzPts val="2800"/>
+              <a:buNone/>
+              <a:defRPr/>
+            </a:lvl8pPr>
+            <a:lvl9pPr lvl="8">
+              <a:spcBef>
+                <a:spcPts val="0"/>
+              </a:spcBef>
+              <a:spcAft>
+                <a:spcPts val="0"/>
+              </a:spcAft>
+              <a:buSzPts val="2800"/>
+              <a:buNone/>
+              <a:defRPr/>
+            </a:lvl9pPr>
+          </a:lstStyle>
+          <a:p>
+            <a:endParaRPr/>
+          </a:p>
+        </p:txBody>
+      </p:sp>
+      <p:sp>
+        <p:nvSpPr>
+          <p:cNvPr id="18" name="Google Shape;18;p4"/>
+          <p:cNvSpPr txBox="1">
+            <a:spLocks noGrp="1"/>
+          </p:cNvSpPr>
+          <p:nvPr>
+            <p:ph type="body" idx="1"/>
+          </p:nvPr>
+        </p:nvSpPr>
+        <p:spPr>
+          <a:xfrm>
+            <a:off x="415600" y="1536633"/>
+            <a:ext cx="11360800" cy="4555200"/>
+          </a:xfrm>
+          <a:prstGeom prst="rect">
+            <a:avLst/>
+          </a:prstGeom>
+        </p:spPr>
+        <p:txBody>
+          <a:bodyPr spcFirstLastPara="1" wrap="square" lIns="91425" tIns="91425" rIns="91425" bIns="91425" anchor="t" anchorCtr="0">
+            <a:noAutofit/>
+          </a:bodyPr>
+          <a:lstStyle>
+            <a:lvl1pPr marL="609585" lvl="0" indent="-457189">
+              <a:spcBef>
+                <a:spcPts val="0"/>
+              </a:spcBef>
+              <a:spcAft>
+                <a:spcPts val="0"/>
+              </a:spcAft>
+              <a:buSzPts val="1800"/>
+              <a:buChar char="●"/>
+              <a:defRPr/>
+            </a:lvl1pPr>
+            <a:lvl2pPr marL="1219170" lvl="1" indent="-423323">
+              <a:spcBef>
+                <a:spcPts val="2133"/>
+              </a:spcBef>
+              <a:spcAft>
+                <a:spcPts val="0"/>
+              </a:spcAft>
+              <a:buSzPts val="1400"/>
+              <a:buChar char="○"/>
+              <a:defRPr/>
+            </a:lvl2pPr>
+            <a:lvl3pPr marL="1828754" lvl="2" indent="-423323">
+              <a:spcBef>
+                <a:spcPts val="2133"/>
+              </a:spcBef>
+              <a:spcAft>
+                <a:spcPts val="0"/>
+              </a:spcAft>
+              <a:buSzPts val="1400"/>
+              <a:buChar char="■"/>
+              <a:defRPr/>
+            </a:lvl3pPr>
+            <a:lvl4pPr marL="2438339" lvl="3" indent="-423323">
+              <a:spcBef>
+                <a:spcPts val="2133"/>
+              </a:spcBef>
+              <a:spcAft>
+                <a:spcPts val="0"/>
+              </a:spcAft>
+              <a:buSzPts val="1400"/>
+              <a:buChar char="●"/>
+              <a:defRPr/>
+            </a:lvl4pPr>
+            <a:lvl5pPr marL="3047924" lvl="4" indent="-423323">
+              <a:spcBef>
+                <a:spcPts val="2133"/>
+              </a:spcBef>
+              <a:spcAft>
+                <a:spcPts val="0"/>
+              </a:spcAft>
+              <a:buSzPts val="1400"/>
+              <a:buChar char="○"/>
+              <a:defRPr/>
+            </a:lvl5pPr>
+            <a:lvl6pPr marL="3657509" lvl="5" indent="-423323">
+              <a:spcBef>
+                <a:spcPts val="2133"/>
+              </a:spcBef>
+              <a:spcAft>
+                <a:spcPts val="0"/>
+              </a:spcAft>
+              <a:buSzPts val="1400"/>
+              <a:buChar char="■"/>
+              <a:defRPr/>
+            </a:lvl6pPr>
+            <a:lvl7pPr marL="4267093" lvl="6" indent="-423323">
+              <a:spcBef>
+                <a:spcPts val="2133"/>
+              </a:spcBef>
+              <a:spcAft>
+                <a:spcPts val="0"/>
+              </a:spcAft>
+              <a:buSzPts val="1400"/>
+              <a:buChar char="●"/>
+              <a:defRPr/>
+            </a:lvl7pPr>
+            <a:lvl8pPr marL="4876678" lvl="7" indent="-423323">
+              <a:spcBef>
+                <a:spcPts val="2133"/>
+              </a:spcBef>
+              <a:spcAft>
+                <a:spcPts val="0"/>
+              </a:spcAft>
+              <a:buSzPts val="1400"/>
+              <a:buChar char="○"/>
+              <a:defRPr/>
+            </a:lvl8pPr>
+            <a:lvl9pPr marL="5486263" lvl="8" indent="-423323">
+              <a:spcBef>
+                <a:spcPts val="2133"/>
+              </a:spcBef>
+              <a:spcAft>
+                <a:spcPts val="2133"/>
+              </a:spcAft>
+              <a:buSzPts val="1400"/>
+              <a:buChar char="■"/>
+              <a:defRPr/>
+            </a:lvl9pPr>
+          </a:lstStyle>
+          <a:p>
+            <a:endParaRPr/>
+          </a:p>
+        </p:txBody>
+      </p:sp>
+      <p:sp>
+        <p:nvSpPr>
+          <p:cNvPr id="19" name="Google Shape;19;p4"/>
+          <p:cNvSpPr txBox="1">
+            <a:spLocks noGrp="1"/>
+          </p:cNvSpPr>
+          <p:nvPr>
+            <p:ph type="sldNum" idx="12"/>
+          </p:nvPr>
+        </p:nvSpPr>
+        <p:spPr>
+          <a:xfrm>
+            <a:off x="11296611" y="6217623"/>
+            <a:ext cx="731600" cy="524800"/>
+          </a:xfrm>
+          <a:prstGeom prst="rect">
+            <a:avLst/>
+          </a:prstGeom>
+        </p:spPr>
+        <p:txBody>
+          <a:bodyPr spcFirstLastPara="1" wrap="square" lIns="91425" tIns="91425" rIns="91425" bIns="91425" anchor="ctr" anchorCtr="0">
+            <a:noAutofit/>
+          </a:bodyPr>
+          <a:lstStyle>
+            <a:lvl1pPr lvl="0">
+              <a:buNone/>
+              <a:defRPr/>
+            </a:lvl1pPr>
+            <a:lvl2pPr lvl="1">
+              <a:buNone/>
+              <a:defRPr/>
+            </a:lvl2pPr>
+            <a:lvl3pPr lvl="2">
+              <a:buNone/>
+              <a:defRPr/>
+            </a:lvl3pPr>
+            <a:lvl4pPr lvl="3">
+              <a:buNone/>
+              <a:defRPr/>
+            </a:lvl4pPr>
+            <a:lvl5pPr lvl="4">
+              <a:buNone/>
+              <a:defRPr/>
+            </a:lvl5pPr>
+            <a:lvl6pPr lvl="5">
+              <a:buNone/>
+              <a:defRPr/>
+            </a:lvl6pPr>
+            <a:lvl7pPr lvl="6">
+              <a:buNone/>
+              <a:defRPr/>
+            </a:lvl7pPr>
+            <a:lvl8pPr lvl="7">
+              <a:buNone/>
+              <a:defRPr/>
+            </a:lvl8pPr>
+            <a:lvl9pPr lvl="8">
+              <a:buNone/>
+              <a:defRPr/>
+            </a:lvl9pPr>
+          </a:lstStyle>
+          <a:p>
+            <a:fld id="{00000000-1234-1234-1234-123412341234}" type="slidenum">
+              <a:rPr lang="en" smtClean="0"/>
+              <a:pPr/>
+              <a:t>‹#›</a:t>
+            </a:fld>
+            <a:endParaRPr lang="en"/>
+          </a:p>
+        </p:txBody>
+      </p:sp>
+    </p:spTree>
+    <p:extLst>
+      <p:ext uri="{BB962C8B-B14F-4D97-AF65-F5344CB8AC3E}">
+        <p14:creationId xmlns:p14="http://schemas.microsoft.com/office/powerpoint/2010/main" val="1842684907"/>
       </p:ext>
     </p:extLst>
   </p:cSld>
@@ -863,7 +2004,7 @@
           <a:p>
             <a:fld id="{CE88D40F-0E01-46E3-A0A3-09B1E418DDBF}" type="datetimeFigureOut">
               <a:rPr lang="en-US" smtClean="0"/>
-              <a:t>1/26/2021</a:t>
+              <a:t>2/8/2021</a:t>
             </a:fld>
             <a:endParaRPr lang="en-US"/>
           </a:p>
@@ -1138,7 +2279,7 @@
           <a:p>
             <a:fld id="{CE88D40F-0E01-46E3-A0A3-09B1E418DDBF}" type="datetimeFigureOut">
               <a:rPr lang="en-US" smtClean="0"/>
-              <a:t>1/26/2021</a:t>
+              <a:t>2/8/2021</a:t>
             </a:fld>
             <a:endParaRPr lang="en-US"/>
           </a:p>
@@ -1403,7 +2544,7 @@
           <a:p>
             <a:fld id="{CE88D40F-0E01-46E3-A0A3-09B1E418DDBF}" type="datetimeFigureOut">
               <a:rPr lang="en-US" smtClean="0"/>
-              <a:t>1/26/2021</a:t>
+              <a:t>2/8/2021</a:t>
             </a:fld>
             <a:endParaRPr lang="en-US"/>
           </a:p>
@@ -1815,7 +2956,7 @@
           <a:p>
             <a:fld id="{CE88D40F-0E01-46E3-A0A3-09B1E418DDBF}" type="datetimeFigureOut">
               <a:rPr lang="en-US" smtClean="0"/>
-              <a:t>1/26/2021</a:t>
+              <a:t>2/8/2021</a:t>
             </a:fld>
             <a:endParaRPr lang="en-US"/>
           </a:p>
@@ -1956,7 +3097,7 @@
           <a:p>
             <a:fld id="{CE88D40F-0E01-46E3-A0A3-09B1E418DDBF}" type="datetimeFigureOut">
               <a:rPr lang="en-US" smtClean="0"/>
-              <a:t>1/26/2021</a:t>
+              <a:t>2/8/2021</a:t>
             </a:fld>
             <a:endParaRPr lang="en-US"/>
           </a:p>
@@ -2069,7 +3210,7 @@
           <a:p>
             <a:fld id="{CE88D40F-0E01-46E3-A0A3-09B1E418DDBF}" type="datetimeFigureOut">
               <a:rPr lang="en-US" smtClean="0"/>
-              <a:t>1/26/2021</a:t>
+              <a:t>2/8/2021</a:t>
             </a:fld>
             <a:endParaRPr lang="en-US"/>
           </a:p>
@@ -2380,7 +3521,7 @@
           <a:p>
             <a:fld id="{CE88D40F-0E01-46E3-A0A3-09B1E418DDBF}" type="datetimeFigureOut">
               <a:rPr lang="en-US" smtClean="0"/>
-              <a:t>1/26/2021</a:t>
+              <a:t>2/8/2021</a:t>
             </a:fld>
             <a:endParaRPr lang="en-US"/>
           </a:p>
@@ -2668,7 +3809,7 @@
           <a:p>
             <a:fld id="{CE88D40F-0E01-46E3-A0A3-09B1E418DDBF}" type="datetimeFigureOut">
               <a:rPr lang="en-US" smtClean="0"/>
-              <a:t>1/26/2021</a:t>
+              <a:t>2/8/2021</a:t>
             </a:fld>
             <a:endParaRPr lang="en-US"/>
           </a:p>
@@ -2909,7 +4050,7 @@
           <a:p>
             <a:fld id="{CE88D40F-0E01-46E3-A0A3-09B1E418DDBF}" type="datetimeFigureOut">
               <a:rPr lang="en-US" smtClean="0"/>
-              <a:t>1/26/2021</a:t>
+              <a:t>2/8/2021</a:t>
             </a:fld>
             <a:endParaRPr lang="en-US"/>
           </a:p>
@@ -3025,6 +4166,7 @@
     <p:sldLayoutId id="2147483657" r:id="rId9"/>
     <p:sldLayoutId id="2147483658" r:id="rId10"/>
     <p:sldLayoutId id="2147483659" r:id="rId11"/>
+    <p:sldLayoutId id="2147483660" r:id="rId12"/>
   </p:sldLayoutIdLst>
   <p:txStyles>
     <p:titleStyle>
@@ -4541,6 +5683,882 @@
 </p:sld>
 </file>
 
+<file path=ppt/slides/slide2.xml><?xml version="1.0" encoding="utf-8"?>
+<p:sld xmlns:a="http://schemas.openxmlformats.org/drawingml/2006/main" xmlns:r="http://schemas.openxmlformats.org/officeDocument/2006/relationships" xmlns:p="http://schemas.openxmlformats.org/presentationml/2006/main">
+  <p:cSld>
+    <p:spTree>
+      <p:nvGrpSpPr>
+        <p:cNvPr id="1" name="Shape 60"/>
+        <p:cNvGrpSpPr/>
+        <p:nvPr/>
+      </p:nvGrpSpPr>
+      <p:grpSpPr>
+        <a:xfrm>
+          <a:off x="0" y="0"/>
+          <a:ext cx="0" cy="0"/>
+          <a:chOff x="0" y="0"/>
+          <a:chExt cx="0" cy="0"/>
+        </a:xfrm>
+      </p:grpSpPr>
+      <p:sp>
+        <p:nvSpPr>
+          <p:cNvPr id="61" name="Google Shape;61;p14"/>
+          <p:cNvSpPr txBox="1">
+            <a:spLocks noGrp="1"/>
+          </p:cNvSpPr>
+          <p:nvPr>
+            <p:ph type="title"/>
+          </p:nvPr>
+        </p:nvSpPr>
+        <p:spPr>
+          <a:xfrm>
+            <a:off x="415600" y="593367"/>
+            <a:ext cx="11360800" cy="763600"/>
+          </a:xfrm>
+          <a:prstGeom prst="rect">
+            <a:avLst/>
+          </a:prstGeom>
+        </p:spPr>
+        <p:txBody>
+          <a:bodyPr spcFirstLastPara="1" vert="horz" wrap="square" lIns="121900" tIns="121900" rIns="121900" bIns="121900" rtlCol="0" anchor="t" anchorCtr="0">
+            <a:noAutofit/>
+          </a:bodyPr>
+          <a:lstStyle/>
+          <a:p>
+            <a:r>
+              <a:rPr lang="en"/>
+              <a:t>Agenda</a:t>
+            </a:r>
+            <a:endParaRPr/>
+          </a:p>
+        </p:txBody>
+      </p:sp>
+      <p:sp>
+        <p:nvSpPr>
+          <p:cNvPr id="62" name="Google Shape;62;p14"/>
+          <p:cNvSpPr txBox="1">
+            <a:spLocks noGrp="1"/>
+          </p:cNvSpPr>
+          <p:nvPr>
+            <p:ph type="body" idx="1"/>
+          </p:nvPr>
+        </p:nvSpPr>
+        <p:spPr>
+          <a:xfrm>
+            <a:off x="415600" y="1536633"/>
+            <a:ext cx="11360800" cy="4555200"/>
+          </a:xfrm>
+          <a:prstGeom prst="rect">
+            <a:avLst/>
+          </a:prstGeom>
+        </p:spPr>
+        <p:txBody>
+          <a:bodyPr spcFirstLastPara="1" vert="horz" wrap="square" lIns="121900" tIns="121900" rIns="121900" bIns="121900" rtlCol="0" anchor="t" anchorCtr="0">
+            <a:noAutofit/>
+          </a:bodyPr>
+          <a:lstStyle/>
+          <a:p>
+            <a:pPr marL="0" indent="0">
+              <a:buNone/>
+            </a:pPr>
+            <a:r>
+              <a:rPr lang="en" dirty="0"/>
+              <a:t>17:05 – </a:t>
+            </a:r>
+            <a:r>
+              <a:rPr lang="nb-NO" dirty="0"/>
+              <a:t>start</a:t>
+            </a:r>
+          </a:p>
+          <a:p>
+            <a:pPr marL="0" indent="0">
+              <a:buNone/>
+            </a:pPr>
+            <a:endParaRPr lang="nb-NO" dirty="0"/>
+          </a:p>
+          <a:p>
+            <a:pPr marL="380990" indent="-380990"/>
+            <a:r>
+              <a:rPr lang="nb-NO" dirty="0"/>
+              <a:t>W</a:t>
+            </a:r>
+            <a:r>
+              <a:rPr lang="en" dirty="0"/>
+              <a:t>elcome </a:t>
+            </a:r>
+            <a:endParaRPr lang="ru-RU" dirty="0"/>
+          </a:p>
+          <a:p>
+            <a:pPr marL="380990" indent="-380990"/>
+            <a:endParaRPr lang="ru-RU" dirty="0"/>
+          </a:p>
+          <a:p>
+            <a:pPr marL="380990" indent="-380990"/>
+            <a:r>
+              <a:rPr lang="en" dirty="0"/>
+              <a:t>Microsoft Azure Badges</a:t>
+            </a:r>
+            <a:endParaRPr lang="ru-RU" dirty="0"/>
+          </a:p>
+          <a:p>
+            <a:pPr marL="380990" indent="-380990"/>
+            <a:endParaRPr lang="ru-RU" dirty="0"/>
+          </a:p>
+          <a:p>
+            <a:pPr marL="380990" indent="-380990"/>
+            <a:r>
+              <a:rPr lang="nb-NO" dirty="0"/>
+              <a:t>Practical info </a:t>
+            </a:r>
+            <a:endParaRPr lang="en" dirty="0"/>
+          </a:p>
+          <a:p>
+            <a:pPr marL="380990" indent="-380990">
+              <a:spcBef>
+                <a:spcPts val="2133"/>
+              </a:spcBef>
+            </a:pPr>
+            <a:r>
+              <a:rPr lang="nb-NO" dirty="0"/>
+              <a:t>Start workshop</a:t>
+            </a:r>
+            <a:endParaRPr dirty="0"/>
+          </a:p>
+          <a:p>
+            <a:pPr marL="0" indent="0">
+              <a:spcBef>
+                <a:spcPts val="2133"/>
+              </a:spcBef>
+              <a:buClr>
+                <a:schemeClr val="dk1"/>
+              </a:buClr>
+              <a:buSzPts val="1100"/>
+              <a:buNone/>
+            </a:pPr>
+            <a:endParaRPr dirty="0"/>
+          </a:p>
+          <a:p>
+            <a:pPr marL="0" indent="0">
+              <a:spcBef>
+                <a:spcPts val="2133"/>
+              </a:spcBef>
+              <a:spcAft>
+                <a:spcPts val="2133"/>
+              </a:spcAft>
+              <a:buNone/>
+            </a:pPr>
+            <a:endParaRPr dirty="0"/>
+          </a:p>
+        </p:txBody>
+      </p:sp>
+      <p:pic>
+        <p:nvPicPr>
+          <p:cNvPr id="5" name="Google Shape;56;p13">
+            <a:extLst>
+              <a:ext uri="{FF2B5EF4-FFF2-40B4-BE49-F238E27FC236}">
+                <a16:creationId xmlns:a16="http://schemas.microsoft.com/office/drawing/2014/main" id="{FD9994DA-0D1F-4794-A5D8-1EB266677D25}"/>
+              </a:ext>
+            </a:extLst>
+          </p:cNvPr>
+          <p:cNvPicPr preferRelativeResize="0"/>
+          <p:nvPr/>
+        </p:nvPicPr>
+        <p:blipFill>
+          <a:blip r:embed="rId3">
+            <a:alphaModFix/>
+          </a:blip>
+          <a:stretch>
+            <a:fillRect/>
+          </a:stretch>
+        </p:blipFill>
+        <p:spPr>
+          <a:xfrm>
+            <a:off x="10989179" y="5736492"/>
+            <a:ext cx="1202821" cy="1121508"/>
+          </a:xfrm>
+          <a:prstGeom prst="rect">
+            <a:avLst/>
+          </a:prstGeom>
+          <a:noFill/>
+          <a:ln>
+            <a:noFill/>
+          </a:ln>
+        </p:spPr>
+      </p:pic>
+    </p:spTree>
+  </p:cSld>
+  <p:clrMapOvr>
+    <a:masterClrMapping/>
+  </p:clrMapOvr>
+</p:sld>
+</file>
+
+<file path=ppt/slides/slide3.xml><?xml version="1.0" encoding="utf-8"?>
+<p:sld xmlns:a="http://schemas.openxmlformats.org/drawingml/2006/main" xmlns:r="http://schemas.openxmlformats.org/officeDocument/2006/relationships" xmlns:p="http://schemas.openxmlformats.org/presentationml/2006/main">
+  <p:cSld>
+    <p:spTree>
+      <p:nvGrpSpPr>
+        <p:cNvPr id="1" name="Shape 67"/>
+        <p:cNvGrpSpPr/>
+        <p:nvPr/>
+      </p:nvGrpSpPr>
+      <p:grpSpPr>
+        <a:xfrm>
+          <a:off x="0" y="0"/>
+          <a:ext cx="0" cy="0"/>
+          <a:chOff x="0" y="0"/>
+          <a:chExt cx="0" cy="0"/>
+        </a:xfrm>
+      </p:grpSpPr>
+      <p:sp>
+        <p:nvSpPr>
+          <p:cNvPr id="68" name="Google Shape;68;p15"/>
+          <p:cNvSpPr txBox="1">
+            <a:spLocks noGrp="1"/>
+          </p:cNvSpPr>
+          <p:nvPr>
+            <p:ph type="title"/>
+          </p:nvPr>
+        </p:nvSpPr>
+        <p:spPr>
+          <a:xfrm>
+            <a:off x="415600" y="593367"/>
+            <a:ext cx="11360800" cy="763600"/>
+          </a:xfrm>
+          <a:prstGeom prst="rect">
+            <a:avLst/>
+          </a:prstGeom>
+        </p:spPr>
+        <p:txBody>
+          <a:bodyPr spcFirstLastPara="1" vert="horz" wrap="square" lIns="121900" tIns="121900" rIns="121900" bIns="121900" rtlCol="0" anchor="t" anchorCtr="0">
+            <a:noAutofit/>
+          </a:bodyPr>
+          <a:lstStyle/>
+          <a:p>
+            <a:r>
+              <a:rPr lang="nb-NO" dirty="0"/>
+              <a:t>Practical information</a:t>
+            </a:r>
+            <a:endParaRPr dirty="0"/>
+          </a:p>
+        </p:txBody>
+      </p:sp>
+      <p:sp>
+        <p:nvSpPr>
+          <p:cNvPr id="69" name="Google Shape;69;p15"/>
+          <p:cNvSpPr txBox="1">
+            <a:spLocks noGrp="1"/>
+          </p:cNvSpPr>
+          <p:nvPr>
+            <p:ph type="body" idx="1"/>
+          </p:nvPr>
+        </p:nvSpPr>
+        <p:spPr>
+          <a:xfrm>
+            <a:off x="415600" y="1536633"/>
+            <a:ext cx="11360800" cy="4555200"/>
+          </a:xfrm>
+          <a:prstGeom prst="rect">
+            <a:avLst/>
+          </a:prstGeom>
+        </p:spPr>
+        <p:txBody>
+          <a:bodyPr spcFirstLastPara="1" vert="horz" wrap="square" lIns="121900" tIns="121900" rIns="121900" bIns="121900" rtlCol="0" anchor="t" anchorCtr="0">
+            <a:noAutofit/>
+          </a:bodyPr>
+          <a:lstStyle/>
+          <a:p>
+            <a:pPr marL="380990" indent="-380990">
+              <a:spcAft>
+                <a:spcPts val="2133"/>
+              </a:spcAft>
+            </a:pPr>
+            <a:r>
+              <a:rPr lang="en-US" dirty="0"/>
+              <a:t>I don’t have moderator</a:t>
+            </a:r>
+            <a:endParaRPr lang="en-US" dirty="0">
+              <a:sym typeface="Wingdings" panose="05000000000000000000" pitchFamily="2" charset="2"/>
+            </a:endParaRPr>
+          </a:p>
+          <a:p>
+            <a:pPr marL="380990" indent="-380990">
+              <a:spcAft>
+                <a:spcPts val="2133"/>
+              </a:spcAft>
+            </a:pPr>
+            <a:r>
+              <a:rPr lang="en-US" dirty="0">
+                <a:sym typeface="Wingdings" panose="05000000000000000000" pitchFamily="2" charset="2"/>
+              </a:rPr>
+              <a:t>Let’s help each other, the one who finished </a:t>
+            </a:r>
+            <a:r>
+              <a:rPr lang="en-US" dirty="0" err="1">
+                <a:sym typeface="Wingdings" panose="05000000000000000000" pitchFamily="2" charset="2"/>
+              </a:rPr>
+              <a:t>ealier</a:t>
+            </a:r>
+            <a:r>
+              <a:rPr lang="en-US" dirty="0">
+                <a:sym typeface="Wingdings" panose="05000000000000000000" pitchFamily="2" charset="2"/>
+              </a:rPr>
+              <a:t> can help others</a:t>
+            </a:r>
+            <a:endParaRPr lang="en-US" dirty="0"/>
+          </a:p>
+          <a:p>
+            <a:pPr marL="380990" indent="-380990">
+              <a:spcAft>
+                <a:spcPts val="2133"/>
+              </a:spcAft>
+            </a:pPr>
+            <a:r>
+              <a:rPr lang="en-US" dirty="0"/>
+              <a:t>Labs are available after the event</a:t>
+            </a:r>
+          </a:p>
+          <a:p>
+            <a:pPr marL="380990" indent="-380990">
+              <a:spcAft>
+                <a:spcPts val="2133"/>
+              </a:spcAft>
+            </a:pPr>
+            <a:endParaRPr lang="en-US" dirty="0"/>
+          </a:p>
+          <a:p>
+            <a:pPr marL="380990" indent="-380990">
+              <a:spcAft>
+                <a:spcPts val="2133"/>
+              </a:spcAft>
+            </a:pPr>
+            <a:endParaRPr lang="en-US" dirty="0"/>
+          </a:p>
+        </p:txBody>
+      </p:sp>
+      <p:pic>
+        <p:nvPicPr>
+          <p:cNvPr id="5" name="Google Shape;56;p13">
+            <a:extLst>
+              <a:ext uri="{FF2B5EF4-FFF2-40B4-BE49-F238E27FC236}">
+                <a16:creationId xmlns:a16="http://schemas.microsoft.com/office/drawing/2014/main" id="{EF827ABA-BEE0-4CCD-A3C3-21D4EF756FDB}"/>
+              </a:ext>
+            </a:extLst>
+          </p:cNvPr>
+          <p:cNvPicPr preferRelativeResize="0"/>
+          <p:nvPr/>
+        </p:nvPicPr>
+        <p:blipFill>
+          <a:blip r:embed="rId3">
+            <a:alphaModFix/>
+          </a:blip>
+          <a:stretch>
+            <a:fillRect/>
+          </a:stretch>
+        </p:blipFill>
+        <p:spPr>
+          <a:xfrm>
+            <a:off x="10989179" y="5736492"/>
+            <a:ext cx="1202821" cy="1121508"/>
+          </a:xfrm>
+          <a:prstGeom prst="rect">
+            <a:avLst/>
+          </a:prstGeom>
+          <a:noFill/>
+          <a:ln>
+            <a:noFill/>
+          </a:ln>
+        </p:spPr>
+      </p:pic>
+    </p:spTree>
+  </p:cSld>
+  <p:clrMapOvr>
+    <a:masterClrMapping/>
+  </p:clrMapOvr>
+</p:sld>
+</file>
+
+<file path=ppt/slides/slide4.xml><?xml version="1.0" encoding="utf-8"?>
+<p:sld xmlns:a="http://schemas.openxmlformats.org/drawingml/2006/main" xmlns:r="http://schemas.openxmlformats.org/officeDocument/2006/relationships" xmlns:p="http://schemas.openxmlformats.org/presentationml/2006/main">
+  <p:cSld>
+    <p:spTree>
+      <p:nvGrpSpPr>
+        <p:cNvPr id="1" name="Shape 67"/>
+        <p:cNvGrpSpPr/>
+        <p:nvPr/>
+      </p:nvGrpSpPr>
+      <p:grpSpPr>
+        <a:xfrm>
+          <a:off x="0" y="0"/>
+          <a:ext cx="0" cy="0"/>
+          <a:chOff x="0" y="0"/>
+          <a:chExt cx="0" cy="0"/>
+        </a:xfrm>
+      </p:grpSpPr>
+      <p:sp>
+        <p:nvSpPr>
+          <p:cNvPr id="68" name="Google Shape;68;p15"/>
+          <p:cNvSpPr txBox="1">
+            <a:spLocks noGrp="1"/>
+          </p:cNvSpPr>
+          <p:nvPr>
+            <p:ph type="title"/>
+          </p:nvPr>
+        </p:nvSpPr>
+        <p:spPr>
+          <a:xfrm>
+            <a:off x="415600" y="593367"/>
+            <a:ext cx="11360800" cy="763600"/>
+          </a:xfrm>
+          <a:prstGeom prst="rect">
+            <a:avLst/>
+          </a:prstGeom>
+        </p:spPr>
+        <p:txBody>
+          <a:bodyPr spcFirstLastPara="1" vert="horz" wrap="square" lIns="121900" tIns="121900" rIns="121900" bIns="121900" rtlCol="0" anchor="t" anchorCtr="0">
+            <a:noAutofit/>
+          </a:bodyPr>
+          <a:lstStyle/>
+          <a:p>
+            <a:r>
+              <a:rPr lang="nb-NO" dirty="0"/>
+              <a:t>Microsoft Teams 101</a:t>
+            </a:r>
+            <a:endParaRPr dirty="0"/>
+          </a:p>
+        </p:txBody>
+      </p:sp>
+      <p:sp>
+        <p:nvSpPr>
+          <p:cNvPr id="69" name="Google Shape;69;p15"/>
+          <p:cNvSpPr txBox="1">
+            <a:spLocks noGrp="1"/>
+          </p:cNvSpPr>
+          <p:nvPr>
+            <p:ph type="body" idx="1"/>
+          </p:nvPr>
+        </p:nvSpPr>
+        <p:spPr>
+          <a:xfrm>
+            <a:off x="415600" y="1536633"/>
+            <a:ext cx="11360800" cy="4555200"/>
+          </a:xfrm>
+          <a:prstGeom prst="rect">
+            <a:avLst/>
+          </a:prstGeom>
+        </p:spPr>
+        <p:txBody>
+          <a:bodyPr spcFirstLastPara="1" vert="horz" wrap="square" lIns="121900" tIns="121900" rIns="121900" bIns="121900" rtlCol="0" anchor="t" anchorCtr="0">
+            <a:noAutofit/>
+          </a:bodyPr>
+          <a:lstStyle/>
+          <a:p>
+            <a:pPr marL="380990" indent="-380990">
+              <a:spcAft>
+                <a:spcPts val="2133"/>
+              </a:spcAft>
+            </a:pPr>
+            <a:r>
+              <a:rPr lang="en-US" dirty="0"/>
+              <a:t>Mute your mic (but don’t forget to unmute when you speak)</a:t>
+            </a:r>
+          </a:p>
+          <a:p>
+            <a:pPr marL="380990" indent="-380990">
+              <a:spcAft>
+                <a:spcPts val="2133"/>
+              </a:spcAft>
+            </a:pPr>
+            <a:r>
+              <a:rPr lang="en-US" dirty="0"/>
+              <a:t>Feel free to use Video</a:t>
+            </a:r>
+          </a:p>
+          <a:p>
+            <a:pPr marL="380990" indent="-380990">
+              <a:spcAft>
+                <a:spcPts val="2133"/>
+              </a:spcAft>
+            </a:pPr>
+            <a:r>
+              <a:rPr lang="en-US" dirty="0"/>
+              <a:t>«Rise your hand» if you need some attention</a:t>
+            </a:r>
+          </a:p>
+          <a:p>
+            <a:pPr marL="380990" indent="-380990">
+              <a:spcAft>
+                <a:spcPts val="2133"/>
+              </a:spcAft>
+            </a:pPr>
+            <a:r>
+              <a:rPr lang="en-US" dirty="0"/>
+              <a:t>Conversation</a:t>
+            </a:r>
+          </a:p>
+          <a:p>
+            <a:pPr marL="380990" indent="-380990">
+              <a:spcAft>
+                <a:spcPts val="2133"/>
+              </a:spcAft>
+            </a:pPr>
+            <a:r>
+              <a:rPr lang="en-US" dirty="0"/>
+              <a:t>If you want to have private discussion, find </a:t>
+            </a:r>
+            <a:r>
+              <a:rPr lang="en-US" dirty="0">
+                <a:hlinkClick r:id="rId3"/>
+              </a:rPr>
+              <a:t>evgeny@enso.no</a:t>
+            </a:r>
+            <a:r>
+              <a:rPr lang="en-US" dirty="0"/>
+              <a:t> and start chat with me </a:t>
+            </a:r>
+          </a:p>
+          <a:p>
+            <a:pPr marL="380990" indent="-380990">
+              <a:spcAft>
+                <a:spcPts val="2133"/>
+              </a:spcAft>
+            </a:pPr>
+            <a:r>
+              <a:rPr lang="en-US" dirty="0"/>
+              <a:t>Share screen </a:t>
+            </a:r>
+          </a:p>
+        </p:txBody>
+      </p:sp>
+      <p:pic>
+        <p:nvPicPr>
+          <p:cNvPr id="2" name="Picture 1">
+            <a:extLst>
+              <a:ext uri="{FF2B5EF4-FFF2-40B4-BE49-F238E27FC236}">
+                <a16:creationId xmlns:a16="http://schemas.microsoft.com/office/drawing/2014/main" id="{93FDAD15-0133-42CB-B22E-5EA0CBAB687B}"/>
+              </a:ext>
+            </a:extLst>
+          </p:cNvPr>
+          <p:cNvPicPr>
+            <a:picLocks noChangeAspect="1"/>
+          </p:cNvPicPr>
+          <p:nvPr/>
+        </p:nvPicPr>
+        <p:blipFill>
+          <a:blip r:embed="rId4"/>
+          <a:stretch>
+            <a:fillRect/>
+          </a:stretch>
+        </p:blipFill>
+        <p:spPr>
+          <a:xfrm>
+            <a:off x="3008666" y="3813843"/>
+            <a:ext cx="3637396" cy="819045"/>
+          </a:xfrm>
+          <a:prstGeom prst="rect">
+            <a:avLst/>
+          </a:prstGeom>
+        </p:spPr>
+      </p:pic>
+      <p:pic>
+        <p:nvPicPr>
+          <p:cNvPr id="3" name="Picture 2">
+            <a:extLst>
+              <a:ext uri="{FF2B5EF4-FFF2-40B4-BE49-F238E27FC236}">
+                <a16:creationId xmlns:a16="http://schemas.microsoft.com/office/drawing/2014/main" id="{8C84819E-A625-40F0-BCDC-E2DFEF111510}"/>
+              </a:ext>
+            </a:extLst>
+          </p:cNvPr>
+          <p:cNvPicPr>
+            <a:picLocks noChangeAspect="1"/>
+          </p:cNvPicPr>
+          <p:nvPr/>
+        </p:nvPicPr>
+        <p:blipFill>
+          <a:blip r:embed="rId5"/>
+          <a:stretch>
+            <a:fillRect/>
+          </a:stretch>
+        </p:blipFill>
+        <p:spPr>
+          <a:xfrm>
+            <a:off x="3103628" y="5772385"/>
+            <a:ext cx="3447472" cy="702531"/>
+          </a:xfrm>
+          <a:prstGeom prst="rect">
+            <a:avLst/>
+          </a:prstGeom>
+        </p:spPr>
+      </p:pic>
+      <p:pic>
+        <p:nvPicPr>
+          <p:cNvPr id="7" name="Google Shape;56;p13">
+            <a:extLst>
+              <a:ext uri="{FF2B5EF4-FFF2-40B4-BE49-F238E27FC236}">
+                <a16:creationId xmlns:a16="http://schemas.microsoft.com/office/drawing/2014/main" id="{C7C3329F-2340-4248-9990-99A2AC41C156}"/>
+              </a:ext>
+            </a:extLst>
+          </p:cNvPr>
+          <p:cNvPicPr preferRelativeResize="0"/>
+          <p:nvPr/>
+        </p:nvPicPr>
+        <p:blipFill>
+          <a:blip r:embed="rId6">
+            <a:alphaModFix/>
+          </a:blip>
+          <a:stretch>
+            <a:fillRect/>
+          </a:stretch>
+        </p:blipFill>
+        <p:spPr>
+          <a:xfrm>
+            <a:off x="10989179" y="5736492"/>
+            <a:ext cx="1202821" cy="1121508"/>
+          </a:xfrm>
+          <a:prstGeom prst="rect">
+            <a:avLst/>
+          </a:prstGeom>
+          <a:noFill/>
+          <a:ln>
+            <a:noFill/>
+          </a:ln>
+        </p:spPr>
+      </p:pic>
+      <p:pic>
+        <p:nvPicPr>
+          <p:cNvPr id="5" name="Picture 4">
+            <a:extLst>
+              <a:ext uri="{FF2B5EF4-FFF2-40B4-BE49-F238E27FC236}">
+                <a16:creationId xmlns:a16="http://schemas.microsoft.com/office/drawing/2014/main" id="{0811F3FE-AAEC-40BB-BF0A-BE959E311625}"/>
+              </a:ext>
+            </a:extLst>
+          </p:cNvPr>
+          <p:cNvPicPr>
+            <a:picLocks noChangeAspect="1"/>
+          </p:cNvPicPr>
+          <p:nvPr/>
+        </p:nvPicPr>
+        <p:blipFill>
+          <a:blip r:embed="rId7"/>
+          <a:stretch>
+            <a:fillRect/>
+          </a:stretch>
+        </p:blipFill>
+        <p:spPr>
+          <a:xfrm>
+            <a:off x="7513293" y="3044156"/>
+            <a:ext cx="4320914" cy="769687"/>
+          </a:xfrm>
+          <a:prstGeom prst="rect">
+            <a:avLst/>
+          </a:prstGeom>
+        </p:spPr>
+      </p:pic>
+    </p:spTree>
+    <p:extLst>
+      <p:ext uri="{BB962C8B-B14F-4D97-AF65-F5344CB8AC3E}">
+        <p14:creationId xmlns:p14="http://schemas.microsoft.com/office/powerpoint/2010/main" val="3861844443"/>
+      </p:ext>
+    </p:extLst>
+  </p:cSld>
+  <p:clrMapOvr>
+    <a:masterClrMapping/>
+  </p:clrMapOvr>
+</p:sld>
+</file>
+
+<file path=ppt/slides/slide5.xml><?xml version="1.0" encoding="utf-8"?>
+<p:sld xmlns:a="http://schemas.openxmlformats.org/drawingml/2006/main" xmlns:r="http://schemas.openxmlformats.org/officeDocument/2006/relationships" xmlns:p="http://schemas.openxmlformats.org/presentationml/2006/main">
+  <p:cSld>
+    <p:spTree>
+      <p:nvGrpSpPr>
+        <p:cNvPr id="1" name="Shape 67"/>
+        <p:cNvGrpSpPr/>
+        <p:nvPr/>
+      </p:nvGrpSpPr>
+      <p:grpSpPr>
+        <a:xfrm>
+          <a:off x="0" y="0"/>
+          <a:ext cx="0" cy="0"/>
+          <a:chOff x="0" y="0"/>
+          <a:chExt cx="0" cy="0"/>
+        </a:xfrm>
+      </p:grpSpPr>
+      <p:sp>
+        <p:nvSpPr>
+          <p:cNvPr id="68" name="Google Shape;68;p15"/>
+          <p:cNvSpPr txBox="1">
+            <a:spLocks noGrp="1"/>
+          </p:cNvSpPr>
+          <p:nvPr>
+            <p:ph type="title"/>
+          </p:nvPr>
+        </p:nvSpPr>
+        <p:spPr>
+          <a:xfrm>
+            <a:off x="415600" y="593367"/>
+            <a:ext cx="11360800" cy="763600"/>
+          </a:xfrm>
+          <a:prstGeom prst="rect">
+            <a:avLst/>
+          </a:prstGeom>
+        </p:spPr>
+        <p:txBody>
+          <a:bodyPr spcFirstLastPara="1" vert="horz" wrap="square" lIns="121900" tIns="121900" rIns="121900" bIns="121900" rtlCol="0" anchor="t" anchorCtr="0">
+            <a:noAutofit/>
+          </a:bodyPr>
+          <a:lstStyle/>
+          <a:p>
+            <a:r>
+              <a:rPr lang="nb-NO" dirty="0"/>
+              <a:t>Practical information</a:t>
+            </a:r>
+            <a:endParaRPr dirty="0"/>
+          </a:p>
+        </p:txBody>
+      </p:sp>
+      <p:sp>
+        <p:nvSpPr>
+          <p:cNvPr id="69" name="Google Shape;69;p15"/>
+          <p:cNvSpPr txBox="1">
+            <a:spLocks noGrp="1"/>
+          </p:cNvSpPr>
+          <p:nvPr>
+            <p:ph type="body" idx="1"/>
+          </p:nvPr>
+        </p:nvSpPr>
+        <p:spPr>
+          <a:xfrm>
+            <a:off x="415600" y="1536633"/>
+            <a:ext cx="11360800" cy="4555200"/>
+          </a:xfrm>
+          <a:prstGeom prst="rect">
+            <a:avLst/>
+          </a:prstGeom>
+        </p:spPr>
+        <p:txBody>
+          <a:bodyPr spcFirstLastPara="1" vert="horz" wrap="square" lIns="121900" tIns="121900" rIns="121900" bIns="121900" rtlCol="0" anchor="t" anchorCtr="0">
+            <a:noAutofit/>
+          </a:bodyPr>
+          <a:lstStyle/>
+          <a:p>
+            <a:pPr marL="380990" indent="-380990">
+              <a:spcAft>
+                <a:spcPts val="2133"/>
+              </a:spcAft>
+            </a:pPr>
+            <a:r>
+              <a:rPr lang="en-US" dirty="0"/>
+              <a:t>Each lab is time-boxed</a:t>
+            </a:r>
+          </a:p>
+          <a:p>
+            <a:pPr marL="380990" indent="-380990">
+              <a:spcAft>
+                <a:spcPts val="2133"/>
+              </a:spcAft>
+            </a:pPr>
+            <a:r>
+              <a:rPr lang="en-US" dirty="0"/>
+              <a:t>When you completed a lab, please post to the Conversation channel </a:t>
+            </a:r>
+          </a:p>
+          <a:p>
+            <a:pPr marL="0" indent="0">
+              <a:spcAft>
+                <a:spcPts val="2133"/>
+              </a:spcAft>
+              <a:buNone/>
+            </a:pPr>
+            <a:r>
+              <a:rPr lang="en-US" dirty="0"/>
+              <a:t>	lab-01 (lab-02, lab-03 </a:t>
+            </a:r>
+            <a:r>
+              <a:rPr lang="en-US" dirty="0" err="1"/>
+              <a:t>etc</a:t>
+            </a:r>
+            <a:r>
+              <a:rPr lang="en-US" dirty="0"/>
+              <a:t>…)</a:t>
+            </a:r>
+          </a:p>
+          <a:p>
+            <a:pPr marL="380990" indent="-380990">
+              <a:spcAft>
+                <a:spcPts val="2133"/>
+              </a:spcAft>
+            </a:pPr>
+            <a:r>
+              <a:rPr lang="en-US" dirty="0"/>
+              <a:t>Labs will be available after the event</a:t>
+            </a:r>
+          </a:p>
+          <a:p>
+            <a:pPr marL="380990" indent="-380990">
+              <a:spcAft>
+                <a:spcPts val="2133"/>
+              </a:spcAft>
+            </a:pPr>
+            <a:r>
+              <a:rPr lang="en-US" dirty="0"/>
+              <a:t>Feel free to contribute to the labs content. Fix gramma, typos</a:t>
+            </a:r>
+            <a:r>
+              <a:rPr lang="en-US"/>
+              <a:t>, wrong commands </a:t>
+            </a:r>
+            <a:endParaRPr lang="en-US" dirty="0"/>
+          </a:p>
+        </p:txBody>
+      </p:sp>
+      <p:pic>
+        <p:nvPicPr>
+          <p:cNvPr id="5" name="Google Shape;56;p13">
+            <a:extLst>
+              <a:ext uri="{FF2B5EF4-FFF2-40B4-BE49-F238E27FC236}">
+                <a16:creationId xmlns:a16="http://schemas.microsoft.com/office/drawing/2014/main" id="{81B3B5C5-01A2-434D-A011-DC806F05B875}"/>
+              </a:ext>
+            </a:extLst>
+          </p:cNvPr>
+          <p:cNvPicPr preferRelativeResize="0"/>
+          <p:nvPr/>
+        </p:nvPicPr>
+        <p:blipFill>
+          <a:blip r:embed="rId3">
+            <a:alphaModFix/>
+          </a:blip>
+          <a:stretch>
+            <a:fillRect/>
+          </a:stretch>
+        </p:blipFill>
+        <p:spPr>
+          <a:xfrm>
+            <a:off x="10989179" y="5736492"/>
+            <a:ext cx="1202821" cy="1121508"/>
+          </a:xfrm>
+          <a:prstGeom prst="rect">
+            <a:avLst/>
+          </a:prstGeom>
+          <a:noFill/>
+          <a:ln>
+            <a:noFill/>
+          </a:ln>
+        </p:spPr>
+      </p:pic>
+    </p:spTree>
+    <p:extLst>
+      <p:ext uri="{BB962C8B-B14F-4D97-AF65-F5344CB8AC3E}">
+        <p14:creationId xmlns:p14="http://schemas.microsoft.com/office/powerpoint/2010/main" val="1022140202"/>
+      </p:ext>
+    </p:extLst>
+  </p:cSld>
+  <p:clrMapOvr>
+    <a:masterClrMapping/>
+  </p:clrMapOvr>
+</p:sld>
+</file>
+
 <file path=ppt/theme/theme1.xml><?xml version="1.0" encoding="utf-8"?>
 <a:theme xmlns:a="http://schemas.openxmlformats.org/drawingml/2006/main" name="Office Theme">
   <a:themeElements>
@@ -4834,4 +6852,299 @@
     </a:ext>
   </a:extLst>
 </a:theme>
+</file>
+
+<file path=ppt/theme/theme2.xml><?xml version="1.0" encoding="utf-8"?>
+<a:theme xmlns:a="http://schemas.openxmlformats.org/drawingml/2006/main" name="Office Theme">
+  <a:themeElements>
+    <a:clrScheme name="Office">
+      <a:dk1>
+        <a:sysClr val="windowText" lastClr="000000"/>
+      </a:dk1>
+      <a:lt1>
+        <a:sysClr val="window" lastClr="FFFFFF"/>
+      </a:lt1>
+      <a:dk2>
+        <a:srgbClr val="44546A"/>
+      </a:dk2>
+      <a:lt2>
+        <a:srgbClr val="E7E6E6"/>
+      </a:lt2>
+      <a:accent1>
+        <a:srgbClr val="4472C4"/>
+      </a:accent1>
+      <a:accent2>
+        <a:srgbClr val="ED7D31"/>
+      </a:accent2>
+      <a:accent3>
+        <a:srgbClr val="A5A5A5"/>
+      </a:accent3>
+      <a:accent4>
+        <a:srgbClr val="FFC000"/>
+      </a:accent4>
+      <a:accent5>
+        <a:srgbClr val="5B9BD5"/>
+      </a:accent5>
+      <a:accent6>
+        <a:srgbClr val="70AD47"/>
+      </a:accent6>
+      <a:hlink>
+        <a:srgbClr val="0563C1"/>
+      </a:hlink>
+      <a:folHlink>
+        <a:srgbClr val="954F72"/>
+      </a:folHlink>
+    </a:clrScheme>
+    <a:fontScheme name="Office">
+      <a:majorFont>
+        <a:latin typeface="Calibri Light" panose="020F0302020204030204"/>
+        <a:ea typeface=""/>
+        <a:cs typeface=""/>
+        <a:font script="Jpan" typeface="游ゴシック Light"/>
+        <a:font script="Hang" typeface="맑은 고딕"/>
+        <a:font script="Hans" typeface="等线 Light"/>
+        <a:font script="Hant" typeface="新細明體"/>
+        <a:font script="Arab" typeface="Times New Roman"/>
+        <a:font script="Hebr" typeface="Times New Roman"/>
+        <a:font script="Thai" typeface="Angsana New"/>
+        <a:font script="Ethi" typeface="Nyala"/>
+        <a:font script="Beng" typeface="Vrinda"/>
+        <a:font script="Gujr" typeface="Shruti"/>
+        <a:font script="Khmr" typeface="MoolBoran"/>
+        <a:font script="Knda" typeface="Tunga"/>
+        <a:font script="Guru" typeface="Raavi"/>
+        <a:font script="Cans" typeface="Euphemia"/>
+        <a:font script="Cher" typeface="Plantagenet Cherokee"/>
+        <a:font script="Yiii" typeface="Microsoft Yi Baiti"/>
+        <a:font script="Tibt" typeface="Microsoft Himalaya"/>
+        <a:font script="Thaa" typeface="MV Boli"/>
+        <a:font script="Deva" typeface="Mangal"/>
+        <a:font script="Telu" typeface="Gautami"/>
+        <a:font script="Taml" typeface="Latha"/>
+        <a:font script="Syrc" typeface="Estrangelo Edessa"/>
+        <a:font script="Orya" typeface="Kalinga"/>
+        <a:font script="Mlym" typeface="Kartika"/>
+        <a:font script="Laoo" typeface="DokChampa"/>
+        <a:font script="Sinh" typeface="Iskoola Pota"/>
+        <a:font script="Mong" typeface="Mongolian Baiti"/>
+        <a:font script="Viet" typeface="Times New Roman"/>
+        <a:font script="Uigh" typeface="Microsoft Uighur"/>
+        <a:font script="Geor" typeface="Sylfaen"/>
+        <a:font script="Armn" typeface="Arial"/>
+        <a:font script="Bugi" typeface="Leelawadee UI"/>
+        <a:font script="Bopo" typeface="Microsoft JhengHei"/>
+        <a:font script="Java" typeface="Javanese Text"/>
+        <a:font script="Lisu" typeface="Segoe UI"/>
+        <a:font script="Mymr" typeface="Myanmar Text"/>
+        <a:font script="Nkoo" typeface="Ebrima"/>
+        <a:font script="Olck" typeface="Nirmala UI"/>
+        <a:font script="Osma" typeface="Ebrima"/>
+        <a:font script="Phag" typeface="Phagspa"/>
+        <a:font script="Syrn" typeface="Estrangelo Edessa"/>
+        <a:font script="Syrj" typeface="Estrangelo Edessa"/>
+        <a:font script="Syre" typeface="Estrangelo Edessa"/>
+        <a:font script="Sora" typeface="Nirmala UI"/>
+        <a:font script="Tale" typeface="Microsoft Tai Le"/>
+        <a:font script="Talu" typeface="Microsoft New Tai Lue"/>
+        <a:font script="Tfng" typeface="Ebrima"/>
+      </a:majorFont>
+      <a:minorFont>
+        <a:latin typeface="Calibri" panose="020F0502020204030204"/>
+        <a:ea typeface=""/>
+        <a:cs typeface=""/>
+        <a:font script="Jpan" typeface="游ゴシック"/>
+        <a:font script="Hang" typeface="맑은 고딕"/>
+        <a:font script="Hans" typeface="等线"/>
+        <a:font script="Hant" typeface="新細明體"/>
+        <a:font script="Arab" typeface="Arial"/>
+        <a:font script="Hebr" typeface="Arial"/>
+        <a:font script="Thai" typeface="Cordia New"/>
+        <a:font script="Ethi" typeface="Nyala"/>
+        <a:font script="Beng" typeface="Vrinda"/>
+        <a:font script="Gujr" typeface="Shruti"/>
+        <a:font script="Khmr" typeface="DaunPenh"/>
+        <a:font script="Knda" typeface="Tunga"/>
+        <a:font script="Guru" typeface="Raavi"/>
+        <a:font script="Cans" typeface="Euphemia"/>
+        <a:font script="Cher" typeface="Plantagenet Cherokee"/>
+        <a:font script="Yiii" typeface="Microsoft Yi Baiti"/>
+        <a:font script="Tibt" typeface="Microsoft Himalaya"/>
+        <a:font script="Thaa" typeface="MV Boli"/>
+        <a:font script="Deva" typeface="Mangal"/>
+        <a:font script="Telu" typeface="Gautami"/>
+        <a:font script="Taml" typeface="Latha"/>
+        <a:font script="Syrc" typeface="Estrangelo Edessa"/>
+        <a:font script="Orya" typeface="Kalinga"/>
+        <a:font script="Mlym" typeface="Kartika"/>
+        <a:font script="Laoo" typeface="DokChampa"/>
+        <a:font script="Sinh" typeface="Iskoola Pota"/>
+        <a:font script="Mong" typeface="Mongolian Baiti"/>
+        <a:font script="Viet" typeface="Arial"/>
+        <a:font script="Uigh" typeface="Microsoft Uighur"/>
+        <a:font script="Geor" typeface="Sylfaen"/>
+        <a:font script="Armn" typeface="Arial"/>
+        <a:font script="Bugi" typeface="Leelawadee UI"/>
+        <a:font script="Bopo" typeface="Microsoft JhengHei"/>
+        <a:font script="Java" typeface="Javanese Text"/>
+        <a:font script="Lisu" typeface="Segoe UI"/>
+        <a:font script="Mymr" typeface="Myanmar Text"/>
+        <a:font script="Nkoo" typeface="Ebrima"/>
+        <a:font script="Olck" typeface="Nirmala UI"/>
+        <a:font script="Osma" typeface="Ebrima"/>
+        <a:font script="Phag" typeface="Phagspa"/>
+        <a:font script="Syrn" typeface="Estrangelo Edessa"/>
+        <a:font script="Syrj" typeface="Estrangelo Edessa"/>
+        <a:font script="Syre" typeface="Estrangelo Edessa"/>
+        <a:font script="Sora" typeface="Nirmala UI"/>
+        <a:font script="Tale" typeface="Microsoft Tai Le"/>
+        <a:font script="Talu" typeface="Microsoft New Tai Lue"/>
+        <a:font script="Tfng" typeface="Ebrima"/>
+      </a:minorFont>
+    </a:fontScheme>
+    <a:fmtScheme name="Office">
+      <a:fillStyleLst>
+        <a:solidFill>
+          <a:schemeClr val="phClr"/>
+        </a:solidFill>
+        <a:gradFill rotWithShape="1">
+          <a:gsLst>
+            <a:gs pos="0">
+              <a:schemeClr val="phClr">
+                <a:lumMod val="110000"/>
+                <a:satMod val="105000"/>
+                <a:tint val="67000"/>
+              </a:schemeClr>
+            </a:gs>
+            <a:gs pos="50000">
+              <a:schemeClr val="phClr">
+                <a:lumMod val="105000"/>
+                <a:satMod val="103000"/>
+                <a:tint val="73000"/>
+              </a:schemeClr>
+            </a:gs>
+            <a:gs pos="100000">
+              <a:schemeClr val="phClr">
+                <a:lumMod val="105000"/>
+                <a:satMod val="109000"/>
+                <a:tint val="81000"/>
+              </a:schemeClr>
+            </a:gs>
+          </a:gsLst>
+          <a:lin ang="5400000" scaled="0"/>
+        </a:gradFill>
+        <a:gradFill rotWithShape="1">
+          <a:gsLst>
+            <a:gs pos="0">
+              <a:schemeClr val="phClr">
+                <a:satMod val="103000"/>
+                <a:lumMod val="102000"/>
+                <a:tint val="94000"/>
+              </a:schemeClr>
+            </a:gs>
+            <a:gs pos="50000">
+              <a:schemeClr val="phClr">
+                <a:satMod val="110000"/>
+                <a:lumMod val="100000"/>
+                <a:shade val="100000"/>
+              </a:schemeClr>
+            </a:gs>
+            <a:gs pos="100000">
+              <a:schemeClr val="phClr">
+                <a:lumMod val="99000"/>
+                <a:satMod val="120000"/>
+                <a:shade val="78000"/>
+              </a:schemeClr>
+            </a:gs>
+          </a:gsLst>
+          <a:lin ang="5400000" scaled="0"/>
+        </a:gradFill>
+      </a:fillStyleLst>
+      <a:lnStyleLst>
+        <a:ln w="6350" cap="flat" cmpd="sng" algn="ctr">
+          <a:solidFill>
+            <a:schemeClr val="phClr"/>
+          </a:solidFill>
+          <a:prstDash val="solid"/>
+          <a:miter lim="800000"/>
+        </a:ln>
+        <a:ln w="12700" cap="flat" cmpd="sng" algn="ctr">
+          <a:solidFill>
+            <a:schemeClr val="phClr"/>
+          </a:solidFill>
+          <a:prstDash val="solid"/>
+          <a:miter lim="800000"/>
+        </a:ln>
+        <a:ln w="19050" cap="flat" cmpd="sng" algn="ctr">
+          <a:solidFill>
+            <a:schemeClr val="phClr"/>
+          </a:solidFill>
+          <a:prstDash val="solid"/>
+          <a:miter lim="800000"/>
+        </a:ln>
+      </a:lnStyleLst>
+      <a:effectStyleLst>
+        <a:effectStyle>
+          <a:effectLst/>
+        </a:effectStyle>
+        <a:effectStyle>
+          <a:effectLst/>
+        </a:effectStyle>
+        <a:effectStyle>
+          <a:effectLst>
+            <a:outerShdw blurRad="57150" dist="19050" dir="5400000" algn="ctr" rotWithShape="0">
+              <a:srgbClr val="000000">
+                <a:alpha val="63000"/>
+              </a:srgbClr>
+            </a:outerShdw>
+          </a:effectLst>
+        </a:effectStyle>
+      </a:effectStyleLst>
+      <a:bgFillStyleLst>
+        <a:solidFill>
+          <a:schemeClr val="phClr"/>
+        </a:solidFill>
+        <a:solidFill>
+          <a:schemeClr val="phClr">
+            <a:tint val="95000"/>
+            <a:satMod val="170000"/>
+          </a:schemeClr>
+        </a:solidFill>
+        <a:gradFill rotWithShape="1">
+          <a:gsLst>
+            <a:gs pos="0">
+              <a:schemeClr val="phClr">
+                <a:tint val="93000"/>
+                <a:satMod val="150000"/>
+                <a:shade val="98000"/>
+                <a:lumMod val="102000"/>
+              </a:schemeClr>
+            </a:gs>
+            <a:gs pos="50000">
+              <a:schemeClr val="phClr">
+                <a:tint val="98000"/>
+                <a:satMod val="130000"/>
+                <a:shade val="90000"/>
+                <a:lumMod val="103000"/>
+              </a:schemeClr>
+            </a:gs>
+            <a:gs pos="100000">
+              <a:schemeClr val="phClr">
+                <a:shade val="63000"/>
+                <a:satMod val="120000"/>
+              </a:schemeClr>
+            </a:gs>
+          </a:gsLst>
+          <a:lin ang="5400000" scaled="0"/>
+        </a:gradFill>
+      </a:bgFillStyleLst>
+    </a:fmtScheme>
+  </a:themeElements>
+  <a:objectDefaults/>
+  <a:extraClrSchemeLst/>
+  <a:extLst>
+    <a:ext uri="{05A4C25C-085E-4340-85A3-A5531E510DB2}">
+      <thm15:themeFamily xmlns:thm15="http://schemas.microsoft.com/office/thememl/2012/main" name="Office Theme" id="{62F939B6-93AF-4DB8-9C6B-D6C7DFDC589F}" vid="{4A3C46E8-61CC-4603-A589-7422A47A8E4A}"/>
+    </a:ext>
+  </a:extLst>
+</a:theme>
 </file>
</xml_diff>